<commit_message>
updated split half anaysis
</commit_message>
<xml_diff>
--- a/2022_FRACTAL_VERSION_Share_WMO_TortoiseHare_AnneGECollins/star_stimuli/goals_and_task_proposal.pptx
+++ b/2022_FRACTAL_VERSION_Share_WMO_TortoiseHare_AnneGECollins/star_stimuli/goals_and_task_proposal.pptx
@@ -273,7 +273,7 @@
           <a:p>
             <a:fld id="{35A8370D-945D-A84B-958C-1444F1D6B80E}" type="datetimeFigureOut">
               <a:rPr lang="en-US" smtClean="0"/>
-              <a:t>11/9/22</a:t>
+              <a:t>1/5/23</a:t>
             </a:fld>
             <a:endParaRPr lang="en-US"/>
           </a:p>
@@ -471,7 +471,7 @@
           <a:p>
             <a:fld id="{35A8370D-945D-A84B-958C-1444F1D6B80E}" type="datetimeFigureOut">
               <a:rPr lang="en-US" smtClean="0"/>
-              <a:t>11/9/22</a:t>
+              <a:t>1/5/23</a:t>
             </a:fld>
             <a:endParaRPr lang="en-US"/>
           </a:p>
@@ -679,7 +679,7 @@
           <a:p>
             <a:fld id="{35A8370D-945D-A84B-958C-1444F1D6B80E}" type="datetimeFigureOut">
               <a:rPr lang="en-US" smtClean="0"/>
-              <a:t>11/9/22</a:t>
+              <a:t>1/5/23</a:t>
             </a:fld>
             <a:endParaRPr lang="en-US"/>
           </a:p>
@@ -877,7 +877,7 @@
           <a:p>
             <a:fld id="{35A8370D-945D-A84B-958C-1444F1D6B80E}" type="datetimeFigureOut">
               <a:rPr lang="en-US" smtClean="0"/>
-              <a:t>11/9/22</a:t>
+              <a:t>1/5/23</a:t>
             </a:fld>
             <a:endParaRPr lang="en-US"/>
           </a:p>
@@ -1152,7 +1152,7 @@
           <a:p>
             <a:fld id="{35A8370D-945D-A84B-958C-1444F1D6B80E}" type="datetimeFigureOut">
               <a:rPr lang="en-US" smtClean="0"/>
-              <a:t>11/9/22</a:t>
+              <a:t>1/5/23</a:t>
             </a:fld>
             <a:endParaRPr lang="en-US"/>
           </a:p>
@@ -1417,7 +1417,7 @@
           <a:p>
             <a:fld id="{35A8370D-945D-A84B-958C-1444F1D6B80E}" type="datetimeFigureOut">
               <a:rPr lang="en-US" smtClean="0"/>
-              <a:t>11/9/22</a:t>
+              <a:t>1/5/23</a:t>
             </a:fld>
             <a:endParaRPr lang="en-US"/>
           </a:p>
@@ -1829,7 +1829,7 @@
           <a:p>
             <a:fld id="{35A8370D-945D-A84B-958C-1444F1D6B80E}" type="datetimeFigureOut">
               <a:rPr lang="en-US" smtClean="0"/>
-              <a:t>11/9/22</a:t>
+              <a:t>1/5/23</a:t>
             </a:fld>
             <a:endParaRPr lang="en-US"/>
           </a:p>
@@ -1970,7 +1970,7 @@
           <a:p>
             <a:fld id="{35A8370D-945D-A84B-958C-1444F1D6B80E}" type="datetimeFigureOut">
               <a:rPr lang="en-US" smtClean="0"/>
-              <a:t>11/9/22</a:t>
+              <a:t>1/5/23</a:t>
             </a:fld>
             <a:endParaRPr lang="en-US"/>
           </a:p>
@@ -2083,7 +2083,7 @@
           <a:p>
             <a:fld id="{35A8370D-945D-A84B-958C-1444F1D6B80E}" type="datetimeFigureOut">
               <a:rPr lang="en-US" smtClean="0"/>
-              <a:t>11/9/22</a:t>
+              <a:t>1/5/23</a:t>
             </a:fld>
             <a:endParaRPr lang="en-US"/>
           </a:p>
@@ -2394,7 +2394,7 @@
           <a:p>
             <a:fld id="{35A8370D-945D-A84B-958C-1444F1D6B80E}" type="datetimeFigureOut">
               <a:rPr lang="en-US" smtClean="0"/>
-              <a:t>11/9/22</a:t>
+              <a:t>1/5/23</a:t>
             </a:fld>
             <a:endParaRPr lang="en-US"/>
           </a:p>
@@ -2682,7 +2682,7 @@
           <a:p>
             <a:fld id="{35A8370D-945D-A84B-958C-1444F1D6B80E}" type="datetimeFigureOut">
               <a:rPr lang="en-US" smtClean="0"/>
-              <a:t>11/9/22</a:t>
+              <a:t>1/5/23</a:t>
             </a:fld>
             <a:endParaRPr lang="en-US"/>
           </a:p>
@@ -2923,7 +2923,7 @@
           <a:p>
             <a:fld id="{35A8370D-945D-A84B-958C-1444F1D6B80E}" type="datetimeFigureOut">
               <a:rPr lang="en-US" smtClean="0"/>
-              <a:t>11/9/22</a:t>
+              <a:t>1/5/23</a:t>
             </a:fld>
             <a:endParaRPr lang="en-US"/>
           </a:p>
@@ -4303,7 +4303,7 @@
           <p:nvPr>
             <p:extLst>
               <p:ext uri="{D42A27DB-BD31-4B8C-83A1-F6EECF244321}">
-                <p14:modId xmlns:p14="http://schemas.microsoft.com/office/powerpoint/2010/main" val="2789768137"/>
+                <p14:modId xmlns:p14="http://schemas.microsoft.com/office/powerpoint/2010/main" val="2077037444"/>
               </p:ext>
             </p:extLst>
           </p:nvPr>
@@ -4407,7 +4407,13 @@
                     <a:p>
                       <a:pPr algn="ctr"/>
                       <a:r>
-                        <a:rPr lang="en-US" b="1" dirty="0"/>
+                        <a:rPr lang="en-US" b="1" dirty="0">
+                          <a:solidFill>
+                            <a:schemeClr val="accent6">
+                              <a:lumMod val="50000"/>
+                            </a:schemeClr>
+                          </a:solidFill>
+                        </a:rPr>
                         <a:t>stable</a:t>
                       </a:r>
                     </a:p>
@@ -4546,7 +4552,13 @@
                     <a:p>
                       <a:pPr algn="ctr"/>
                       <a:r>
-                        <a:rPr lang="en-US" b="1" dirty="0"/>
+                        <a:rPr lang="en-US" b="1" dirty="0">
+                          <a:solidFill>
+                            <a:schemeClr val="accent6">
+                              <a:lumMod val="50000"/>
+                            </a:schemeClr>
+                          </a:solidFill>
+                        </a:rPr>
                         <a:t>stable</a:t>
                       </a:r>
                     </a:p>
@@ -4904,7 +4916,9 @@
                       <a:r>
                         <a:rPr lang="en-US" b="1" dirty="0">
                           <a:solidFill>
-                            <a:schemeClr val="bg1"/>
+                            <a:schemeClr val="accent6">
+                              <a:lumMod val="50000"/>
+                            </a:schemeClr>
                           </a:solidFill>
                         </a:rPr>
                         <a:t>stable</a:t>
@@ -4980,7 +4994,13 @@
                     <a:p>
                       <a:pPr algn="ctr"/>
                       <a:r>
-                        <a:rPr lang="en-US" b="1" dirty="0"/>
+                        <a:rPr lang="en-US" b="1" dirty="0">
+                          <a:solidFill>
+                            <a:schemeClr val="accent6">
+                              <a:lumMod val="50000"/>
+                            </a:schemeClr>
+                          </a:solidFill>
+                        </a:rPr>
                         <a:t>stable</a:t>
                       </a:r>
                     </a:p>
@@ -5059,7 +5079,13 @@
                         <a:defRPr/>
                       </a:pPr>
                       <a:r>
-                        <a:rPr lang="en-US" b="1" dirty="0"/>
+                        <a:rPr lang="en-US" b="1" dirty="0">
+                          <a:solidFill>
+                            <a:schemeClr val="accent6">
+                              <a:lumMod val="50000"/>
+                            </a:schemeClr>
+                          </a:solidFill>
+                        </a:rPr>
                         <a:t>stable</a:t>
                       </a:r>
                     </a:p>
@@ -5135,7 +5161,13 @@
                     <a:p>
                       <a:pPr algn="ctr"/>
                       <a:r>
-                        <a:rPr lang="en-US" b="1" dirty="0"/>
+                        <a:rPr lang="en-US" b="1" dirty="0">
+                          <a:solidFill>
+                            <a:schemeClr val="accent6">
+                              <a:lumMod val="50000"/>
+                            </a:schemeClr>
+                          </a:solidFill>
+                        </a:rPr>
                         <a:t>stable</a:t>
                       </a:r>
                     </a:p>
@@ -5399,7 +5431,13 @@
                     <a:p>
                       <a:pPr algn="ctr"/>
                       <a:r>
-                        <a:rPr lang="en-US" b="1" dirty="0"/>
+                        <a:rPr lang="en-US" b="1" dirty="0">
+                          <a:solidFill>
+                            <a:schemeClr val="accent6">
+                              <a:lumMod val="50000"/>
+                            </a:schemeClr>
+                          </a:solidFill>
+                        </a:rPr>
                         <a:t>stable</a:t>
                       </a:r>
                     </a:p>

</xml_diff>